<commit_message>
fixed typos in Lecture 4
</commit_message>
<xml_diff>
--- a/IAP-CSharp-Lecture-4.pptx
+++ b/IAP-CSharp-Lecture-4.pptx
@@ -338,7 +338,7 @@
           <a:p>
             <a:fld id="{DA274E66-3C54-4BD9-BE9D-FBB596F10639}" type="datetimeFigureOut">
               <a:rPr lang="en-US" smtClean="0"/>
-              <a:t>1/17/2011</a:t>
+              <a:t>1/18/2011</a:t>
             </a:fld>
             <a:endParaRPr lang="en-US"/>
           </a:p>
@@ -508,7 +508,7 @@
           <a:p>
             <a:fld id="{DA274E66-3C54-4BD9-BE9D-FBB596F10639}" type="datetimeFigureOut">
               <a:rPr lang="en-US" smtClean="0"/>
-              <a:t>1/17/2011</a:t>
+              <a:t>1/18/2011</a:t>
             </a:fld>
             <a:endParaRPr lang="en-US"/>
           </a:p>
@@ -688,7 +688,7 @@
           <a:p>
             <a:fld id="{DA274E66-3C54-4BD9-BE9D-FBB596F10639}" type="datetimeFigureOut">
               <a:rPr lang="en-US" smtClean="0"/>
-              <a:t>1/17/2011</a:t>
+              <a:t>1/18/2011</a:t>
             </a:fld>
             <a:endParaRPr lang="en-US"/>
           </a:p>
@@ -858,7 +858,7 @@
           <a:p>
             <a:fld id="{DA274E66-3C54-4BD9-BE9D-FBB596F10639}" type="datetimeFigureOut">
               <a:rPr lang="en-US" smtClean="0"/>
-              <a:t>1/17/2011</a:t>
+              <a:t>1/18/2011</a:t>
             </a:fld>
             <a:endParaRPr lang="en-US"/>
           </a:p>
@@ -1104,7 +1104,7 @@
           <a:p>
             <a:fld id="{DA274E66-3C54-4BD9-BE9D-FBB596F10639}" type="datetimeFigureOut">
               <a:rPr lang="en-US" smtClean="0"/>
-              <a:t>1/17/2011</a:t>
+              <a:t>1/18/2011</a:t>
             </a:fld>
             <a:endParaRPr lang="en-US"/>
           </a:p>
@@ -1392,7 +1392,7 @@
           <a:p>
             <a:fld id="{DA274E66-3C54-4BD9-BE9D-FBB596F10639}" type="datetimeFigureOut">
               <a:rPr lang="en-US" smtClean="0"/>
-              <a:t>1/17/2011</a:t>
+              <a:t>1/18/2011</a:t>
             </a:fld>
             <a:endParaRPr lang="en-US"/>
           </a:p>
@@ -1814,7 +1814,7 @@
           <a:p>
             <a:fld id="{DA274E66-3C54-4BD9-BE9D-FBB596F10639}" type="datetimeFigureOut">
               <a:rPr lang="en-US" smtClean="0"/>
-              <a:t>1/17/2011</a:t>
+              <a:t>1/18/2011</a:t>
             </a:fld>
             <a:endParaRPr lang="en-US"/>
           </a:p>
@@ -1932,7 +1932,7 @@
           <a:p>
             <a:fld id="{DA274E66-3C54-4BD9-BE9D-FBB596F10639}" type="datetimeFigureOut">
               <a:rPr lang="en-US" smtClean="0"/>
-              <a:t>1/17/2011</a:t>
+              <a:t>1/18/2011</a:t>
             </a:fld>
             <a:endParaRPr lang="en-US"/>
           </a:p>
@@ -2027,7 +2027,7 @@
           <a:p>
             <a:fld id="{DA274E66-3C54-4BD9-BE9D-FBB596F10639}" type="datetimeFigureOut">
               <a:rPr lang="en-US" smtClean="0"/>
-              <a:t>1/17/2011</a:t>
+              <a:t>1/18/2011</a:t>
             </a:fld>
             <a:endParaRPr lang="en-US"/>
           </a:p>
@@ -2304,7 +2304,7 @@
           <a:p>
             <a:fld id="{DA274E66-3C54-4BD9-BE9D-FBB596F10639}" type="datetimeFigureOut">
               <a:rPr lang="en-US" smtClean="0"/>
-              <a:t>1/17/2011</a:t>
+              <a:t>1/18/2011</a:t>
             </a:fld>
             <a:endParaRPr lang="en-US"/>
           </a:p>
@@ -2557,7 +2557,7 @@
           <a:p>
             <a:fld id="{DA274E66-3C54-4BD9-BE9D-FBB596F10639}" type="datetimeFigureOut">
               <a:rPr lang="en-US" smtClean="0"/>
-              <a:t>1/17/2011</a:t>
+              <a:t>1/18/2011</a:t>
             </a:fld>
             <a:endParaRPr lang="en-US"/>
           </a:p>
@@ -2770,7 +2770,7 @@
           <a:p>
             <a:fld id="{DA274E66-3C54-4BD9-BE9D-FBB596F10639}" type="datetimeFigureOut">
               <a:rPr lang="en-US" smtClean="0"/>
-              <a:t>1/17/2011</a:t>
+              <a:t>1/18/2011</a:t>
             </a:fld>
             <a:endParaRPr lang="en-US"/>
           </a:p>
@@ -3177,20 +3177,12 @@
               <a:rPr lang="en-US" dirty="0" smtClean="0"/>
               <a:t> Syntax, then start</a:t>
             </a:r>
-            <a:r>
-              <a:rPr lang="en-US" dirty="0" smtClean="0"/>
-              <a:t/>
-            </a:r>
             <a:br>
               <a:rPr lang="en-US" dirty="0" smtClean="0"/>
             </a:br>
             <a:r>
               <a:rPr lang="en-US" dirty="0" smtClean="0"/>
-              <a:t>Windows </a:t>
-            </a:r>
-            <a:r>
-              <a:rPr lang="en-US" dirty="0" smtClean="0"/>
-              <a:t>Presentation Foundation</a:t>
+              <a:t>Windows Presentation Foundation</a:t>
             </a:r>
             <a:endParaRPr lang="en-US" dirty="0"/>
           </a:p>
@@ -38791,20 +38783,43 @@
         </p:nvSpPr>
         <p:spPr>
           <a:xfrm>
-            <a:off x="3962400" y="0"/>
-            <a:ext cx="5414682" cy="914400"/>
+            <a:off x="4953000" y="0"/>
+            <a:ext cx="4195482" cy="1600200"/>
           </a:xfrm>
         </p:spPr>
         <p:txBody>
           <a:bodyPr>
-            <a:normAutofit fontScale="92500" lnSpcReduction="10000"/>
+            <a:normAutofit fontScale="85000" lnSpcReduction="10000"/>
           </a:bodyPr>
           <a:lstStyle/>
           <a:p>
             <a:r>
               <a:rPr lang="en-US" dirty="0" smtClean="0"/>
-              <a:t>Can handle all Exception is a single catch block</a:t>
-            </a:r>
+              <a:t>Can handle all </a:t>
+            </a:r>
+            <a:r>
+              <a:rPr lang="en-US" dirty="0" smtClean="0"/>
+              <a:t>exceptions in a </a:t>
+            </a:r>
+            <a:r>
+              <a:rPr lang="en-US" dirty="0" smtClean="0"/>
+              <a:t>single catch </a:t>
+            </a:r>
+            <a:r>
+              <a:rPr lang="en-US" dirty="0" smtClean="0"/>
+              <a:t>block</a:t>
+            </a:r>
+          </a:p>
+          <a:p>
+            <a:pPr lvl="1"/>
+            <a:r>
+              <a:rPr lang="en-US" dirty="0" smtClean="0"/>
+              <a:t>All exceptions subclass Exception</a:t>
+            </a:r>
+          </a:p>
+          <a:p>
+            <a:pPr lvl="1"/>
+            <a:endParaRPr lang="en-US" dirty="0" smtClean="0"/>
           </a:p>
         </p:txBody>
       </p:sp>
@@ -39735,20 +39750,25 @@
         </p:nvSpPr>
         <p:spPr>
           <a:xfrm>
-            <a:off x="3962400" y="0"/>
-            <a:ext cx="5414682" cy="914400"/>
+            <a:off x="4724400" y="0"/>
+            <a:ext cx="4424082" cy="1524000"/>
           </a:xfrm>
         </p:spPr>
         <p:txBody>
           <a:bodyPr>
-            <a:normAutofit fontScale="92500" lnSpcReduction="10000"/>
+            <a:normAutofit/>
           </a:bodyPr>
           <a:lstStyle/>
           <a:p>
             <a:r>
               <a:rPr lang="en-US" dirty="0" smtClean="0"/>
-              <a:t>Or, handle each type of exception individually</a:t>
-            </a:r>
+              <a:t>Or, handle each type of exception </a:t>
+            </a:r>
+            <a:r>
+              <a:rPr lang="en-US" dirty="0" smtClean="0"/>
+              <a:t>individually</a:t>
+            </a:r>
+            <a:endParaRPr lang="en-US" dirty="0" smtClean="0"/>
           </a:p>
         </p:txBody>
       </p:sp>

</xml_diff>

<commit_message>
updates to lecture 4
</commit_message>
<xml_diff>
--- a/IAP-CSharp-Lecture-4.pptx
+++ b/IAP-CSharp-Lecture-4.pptx
@@ -3401,6 +3401,13 @@
   <p:clrMapOvr>
     <a:masterClrMapping/>
   </p:clrMapOvr>
+  <p:timing>
+    <p:tnLst>
+      <p:par>
+        <p:cTn id="1" dur="indefinite" restart="never" nodeType="tmRoot"/>
+      </p:par>
+    </p:tnLst>
+  </p:timing>
 </p:sld>
 </file>
 
@@ -3870,6 +3877,13 @@
   <p:clrMapOvr>
     <a:masterClrMapping/>
   </p:clrMapOvr>
+  <p:timing>
+    <p:tnLst>
+      <p:par>
+        <p:cTn id="1" dur="indefinite" restart="never" nodeType="tmRoot"/>
+      </p:par>
+    </p:tnLst>
+  </p:timing>
 </p:sld>
 </file>
 
@@ -4611,6 +4625,13 @@
   <p:clrMapOvr>
     <a:masterClrMapping/>
   </p:clrMapOvr>
+  <p:timing>
+    <p:tnLst>
+      <p:par>
+        <p:cTn id="1" dur="indefinite" restart="never" nodeType="tmRoot"/>
+      </p:par>
+    </p:tnLst>
+  </p:timing>
 </p:sld>
 </file>
 
@@ -5416,6 +5437,13 @@
   <p:clrMapOvr>
     <a:masterClrMapping/>
   </p:clrMapOvr>
+  <p:timing>
+    <p:tnLst>
+      <p:par>
+        <p:cTn id="1" dur="indefinite" restart="never" nodeType="tmRoot"/>
+      </p:par>
+    </p:tnLst>
+  </p:timing>
 </p:sld>
 </file>
 
@@ -5940,6 +5968,13 @@
   <p:clrMapOvr>
     <a:masterClrMapping/>
   </p:clrMapOvr>
+  <p:timing>
+    <p:tnLst>
+      <p:par>
+        <p:cTn id="1" dur="indefinite" restart="never" nodeType="tmRoot"/>
+      </p:par>
+    </p:tnLst>
+  </p:timing>
 </p:sld>
 </file>
 
@@ -6569,6 +6604,13 @@
   <p:clrMapOvr>
     <a:masterClrMapping/>
   </p:clrMapOvr>
+  <p:timing>
+    <p:tnLst>
+      <p:par>
+        <p:cTn id="1" dur="indefinite" restart="never" nodeType="tmRoot"/>
+      </p:par>
+    </p:tnLst>
+  </p:timing>
 </p:sld>
 </file>
 
@@ -7028,6 +7070,13 @@
   <p:clrMapOvr>
     <a:masterClrMapping/>
   </p:clrMapOvr>
+  <p:timing>
+    <p:tnLst>
+      <p:par>
+        <p:cTn id="1" dur="indefinite" restart="never" nodeType="tmRoot"/>
+      </p:par>
+    </p:tnLst>
+  </p:timing>
 </p:sld>
 </file>
 
@@ -7540,6 +7589,13 @@
   <p:clrMapOvr>
     <a:masterClrMapping/>
   </p:clrMapOvr>
+  <p:timing>
+    <p:tnLst>
+      <p:par>
+        <p:cTn id="1" dur="indefinite" restart="never" nodeType="tmRoot"/>
+      </p:par>
+    </p:tnLst>
+  </p:timing>
 </p:sld>
 </file>
 
@@ -8139,6 +8195,13 @@
   <p:clrMapOvr>
     <a:masterClrMapping/>
   </p:clrMapOvr>
+  <p:timing>
+    <p:tnLst>
+      <p:par>
+        <p:cTn id="1" dur="indefinite" restart="never" nodeType="tmRoot"/>
+      </p:par>
+    </p:tnLst>
+  </p:timing>
 </p:sld>
 </file>
 
@@ -8752,6 +8815,13 @@
   <p:clrMapOvr>
     <a:masterClrMapping/>
   </p:clrMapOvr>
+  <p:timing>
+    <p:tnLst>
+      <p:par>
+        <p:cTn id="1" dur="indefinite" restart="never" nodeType="tmRoot"/>
+      </p:par>
+    </p:tnLst>
+  </p:timing>
 </p:sld>
 </file>
 
@@ -10081,6 +10151,13 @@
   <p:clrMapOvr>
     <a:masterClrMapping/>
   </p:clrMapOvr>
+  <p:timing>
+    <p:tnLst>
+      <p:par>
+        <p:cTn id="1" dur="indefinite" restart="never" nodeType="tmRoot"/>
+      </p:par>
+    </p:tnLst>
+  </p:timing>
 </p:sld>
 </file>
 
@@ -10691,6 +10768,13 @@
   <p:clrMapOvr>
     <a:masterClrMapping/>
   </p:clrMapOvr>
+  <p:timing>
+    <p:tnLst>
+      <p:par>
+        <p:cTn id="1" dur="indefinite" restart="never" nodeType="tmRoot"/>
+      </p:par>
+    </p:tnLst>
+  </p:timing>
 </p:sld>
 </file>
 
@@ -11288,6 +11372,13 @@
   <p:clrMapOvr>
     <a:masterClrMapping/>
   </p:clrMapOvr>
+  <p:timing>
+    <p:tnLst>
+      <p:par>
+        <p:cTn id="1" dur="indefinite" restart="never" nodeType="tmRoot"/>
+      </p:par>
+    </p:tnLst>
+  </p:timing>
 </p:sld>
 </file>
 
@@ -11831,6 +11922,13 @@
   <p:clrMapOvr>
     <a:masterClrMapping/>
   </p:clrMapOvr>
+  <p:timing>
+    <p:tnLst>
+      <p:par>
+        <p:cTn id="1" dur="indefinite" restart="never" nodeType="tmRoot"/>
+      </p:par>
+    </p:tnLst>
+  </p:timing>
 </p:sld>
 </file>
 
@@ -11891,9 +11989,109 @@
           <a:p>
             <a:r>
               <a:rPr lang="en-US" dirty="0" smtClean="0"/>
-              <a:t>Consider the following problem: I have a Messenger who needs to send some message to a number of listeners</a:t>
+              <a:t>Consider the following problem: I have a Messenger who needs to send some </a:t>
+            </a:r>
+            <a:r>
+              <a:rPr lang="en-US" dirty="0" smtClean="0"/>
+              <a:t>message (string) to </a:t>
+            </a:r>
+            <a:r>
+              <a:rPr lang="en-US" dirty="0" smtClean="0"/>
+              <a:t>a number of </a:t>
+            </a:r>
+            <a:r>
+              <a:rPr lang="en-US" dirty="0" smtClean="0"/>
+              <a:t>listeners</a:t>
+            </a:r>
+          </a:p>
+          <a:p>
+            <a:r>
+              <a:rPr lang="en-US" dirty="0" smtClean="0"/>
+              <a:t>To represent a listener, use a delegate:</a:t>
+            </a:r>
+            <a:r>
+              <a:rPr lang="en-US" dirty="0" smtClean="0"/>
+              <a:t> Action&lt;string&gt; (has 1 string argument)</a:t>
             </a:r>
             <a:endParaRPr lang="en-US" dirty="0"/>
+          </a:p>
+        </p:txBody>
+      </p:sp>
+      <p:sp>
+        <p:nvSpPr>
+          <p:cNvPr id="4" name="Rectangle 3"/>
+          <p:cNvSpPr/>
+          <p:nvPr/>
+        </p:nvSpPr>
+        <p:spPr>
+          <a:xfrm>
+            <a:off x="2133600" y="4952999"/>
+            <a:ext cx="5160387" cy="430887"/>
+          </a:xfrm>
+          <a:prstGeom prst="rect">
+            <a:avLst/>
+          </a:prstGeom>
+        </p:spPr>
+        <p:txBody>
+          <a:bodyPr wrap="none">
+            <a:spAutoFit/>
+          </a:bodyPr>
+          <a:lstStyle/>
+          <a:p>
+            <a:r>
+              <a:rPr lang="fr-FR" sz="2200" dirty="0" err="1">
+                <a:solidFill>
+                  <a:srgbClr val="0000FF"/>
+                </a:solidFill>
+                <a:latin typeface="Consolas"/>
+              </a:rPr>
+              <a:t>delegate</a:t>
+            </a:r>
+            <a:r>
+              <a:rPr lang="fr-FR" sz="2200" dirty="0">
+                <a:solidFill>
+                  <a:prstClr val="black"/>
+                </a:solidFill>
+                <a:latin typeface="Consolas"/>
+              </a:rPr>
+              <a:t> </a:t>
+            </a:r>
+            <a:r>
+              <a:rPr lang="fr-FR" sz="2200" dirty="0" err="1">
+                <a:solidFill>
+                  <a:srgbClr val="0000FF"/>
+                </a:solidFill>
+                <a:latin typeface="Consolas"/>
+              </a:rPr>
+              <a:t>void</a:t>
+            </a:r>
+            <a:r>
+              <a:rPr lang="fr-FR" sz="2200" dirty="0">
+                <a:solidFill>
+                  <a:prstClr val="black"/>
+                </a:solidFill>
+                <a:latin typeface="Consolas"/>
+              </a:rPr>
+              <a:t> </a:t>
+            </a:r>
+            <a:r>
+              <a:rPr lang="fr-FR" sz="2200" dirty="0">
+                <a:solidFill>
+                  <a:srgbClr val="2B91AF"/>
+                </a:solidFill>
+                <a:latin typeface="Consolas"/>
+              </a:rPr>
+              <a:t>Action</a:t>
+            </a:r>
+            <a:r>
+              <a:rPr lang="fr-FR" sz="2200" dirty="0">
+                <a:solidFill>
+                  <a:prstClr val="black"/>
+                </a:solidFill>
+                <a:latin typeface="Consolas"/>
+              </a:rPr>
+              <a:t>&lt;T&gt;(T arg1);</a:t>
+            </a:r>
           </a:p>
         </p:txBody>
       </p:sp>
@@ -11907,6 +12105,13 @@
   <p:clrMapOvr>
     <a:masterClrMapping/>
   </p:clrMapOvr>
+  <p:timing>
+    <p:tnLst>
+      <p:par>
+        <p:cTn id="1" dur="indefinite" restart="never" nodeType="tmRoot"/>
+      </p:par>
+    </p:tnLst>
+  </p:timing>
 </p:sld>
 </file>
 
@@ -12602,6 +12807,13 @@
   <p:clrMapOvr>
     <a:masterClrMapping/>
   </p:clrMapOvr>
+  <p:timing>
+    <p:tnLst>
+      <p:par>
+        <p:cTn id="1" dur="indefinite" restart="never" nodeType="tmRoot"/>
+      </p:par>
+    </p:tnLst>
+  </p:timing>
 </p:sld>
 </file>
 
@@ -13779,6 +13991,13 @@
   <p:clrMapOvr>
     <a:masterClrMapping/>
   </p:clrMapOvr>
+  <p:timing>
+    <p:tnLst>
+      <p:par>
+        <p:cTn id="1" dur="indefinite" restart="never" nodeType="tmRoot"/>
+      </p:par>
+    </p:tnLst>
+  </p:timing>
 </p:sld>
 </file>
 
@@ -14360,6 +14579,13 @@
   <p:clrMapOvr>
     <a:masterClrMapping/>
   </p:clrMapOvr>
+  <p:timing>
+    <p:tnLst>
+      <p:par>
+        <p:cTn id="1" dur="indefinite" restart="never" nodeType="tmRoot"/>
+      </p:par>
+    </p:tnLst>
+  </p:timing>
 </p:sld>
 </file>
 
@@ -23749,6 +23975,13 @@
   <p:clrMapOvr>
     <a:masterClrMapping/>
   </p:clrMapOvr>
+  <p:timing>
+    <p:tnLst>
+      <p:par>
+        <p:cTn id="1" dur="indefinite" restart="never" nodeType="tmRoot"/>
+      </p:par>
+    </p:tnLst>
+  </p:timing>
 </p:sld>
 </file>
 
@@ -34786,6 +35019,13 @@
   <p:clrMapOvr>
     <a:masterClrMapping/>
   </p:clrMapOvr>
+  <p:timing>
+    <p:tnLst>
+      <p:par>
+        <p:cTn id="1" dur="indefinite" restart="never" nodeType="tmRoot"/>
+      </p:par>
+    </p:tnLst>
+  </p:timing>
 </p:sld>
 </file>
 
@@ -37959,6 +38199,13 @@
   <p:clrMapOvr>
     <a:masterClrMapping/>
   </p:clrMapOvr>
+  <p:timing>
+    <p:tnLst>
+      <p:par>
+        <p:cTn id="1" dur="indefinite" restart="never" nodeType="tmRoot"/>
+      </p:par>
+    </p:tnLst>
+  </p:timing>
 </p:sld>
 </file>
 
@@ -38833,6 +39080,13 @@
   <p:clrMapOvr>
     <a:masterClrMapping/>
   </p:clrMapOvr>
+  <p:timing>
+    <p:tnLst>
+      <p:par>
+        <p:cTn id="1" dur="indefinite" restart="never" nodeType="tmRoot"/>
+      </p:par>
+    </p:tnLst>
+  </p:timing>
 </p:sld>
 </file>
 
@@ -39782,6 +40036,13 @@
   <p:clrMapOvr>
     <a:masterClrMapping/>
   </p:clrMapOvr>
+  <p:timing>
+    <p:tnLst>
+      <p:par>
+        <p:cTn id="1" dur="indefinite" restart="never" nodeType="tmRoot"/>
+      </p:par>
+    </p:tnLst>
+  </p:timing>
 </p:sld>
 </file>
 
@@ -40383,6 +40644,13 @@
   <p:clrMapOvr>
     <a:masterClrMapping/>
   </p:clrMapOvr>
+  <p:timing>
+    <p:tnLst>
+      <p:par>
+        <p:cTn id="1" dur="indefinite" restart="never" nodeType="tmRoot"/>
+      </p:par>
+    </p:tnLst>
+  </p:timing>
 </p:sld>
 </file>
 

</xml_diff>